<commit_message>
voxel_grid more precise for middle layer
</commit_message>
<xml_diff>
--- a/ThesisPresentationMidtimePresentationTemplate_2024.pptx
+++ b/ThesisPresentationMidtimePresentationTemplate_2024.pptx
@@ -4134,33 +4134,7 @@
           <a:lstStyle/>
           <a:p>
             <a:r>
-              <a:rPr lang="en-GB" noProof="0" dirty="0">
-                <a:solidFill>
-                  <a:srgbClr val="FF0000"/>
-                </a:solidFill>
-              </a:rPr>
-              <a:t>Present </a:t>
-            </a:r>
-            <a:r>
-              <a:rPr lang="en-GB" dirty="0">
-                <a:solidFill>
-                  <a:srgbClr val="FF0000"/>
-                </a:solidFill>
-              </a:rPr>
-              <a:t>t</a:t>
-            </a:r>
-            <a:r>
-              <a:rPr lang="en-GB" noProof="0" dirty="0">
-                <a:solidFill>
-                  <a:srgbClr val="FF0000"/>
-                </a:solidFill>
-              </a:rPr>
-              <a:t>he methods that you have chose and why to answer on your aims</a:t>
-            </a:r>
-          </a:p>
-          <a:p>
-            <a:r>
-              <a:rPr lang="en-US" b="1" dirty="0"/>
+              <a:rPr lang="en-US" b="1" dirty="0" smtClean="0"/>
               <a:t>Tools</a:t>
             </a:r>
             <a:r>

</xml_diff>